<commit_message>
Aktualizacja slajdów ze sponsorami
</commit_message>
<xml_diff>
--- a/Prezentacja.pptx
+++ b/Prezentacja.pptx
@@ -226,7 +226,7 @@
             <a:fld id="{21FB4422-3DC8-45BE-B0A0-D87D16501A8D}" type="datetimeFigureOut">
               <a:rPr lang="en-US" smtClean="0"/>
               <a:pPr/>
-              <a:t>5/13/2016</a:t>
+              <a:t>5/15/2016</a:t>
             </a:fld>
             <a:endParaRPr lang="en-US" dirty="0"/>
           </a:p>
@@ -4572,7 +4572,7 @@
       </p:grpSpPr>
       <p:pic>
         <p:nvPicPr>
-          <p:cNvPr id="7" name="Obraz 6"/>
+          <p:cNvPr id="4" name="Obraz 3"/>
           <p:cNvPicPr>
             <a:picLocks noChangeAspect="1"/>
           </p:cNvPicPr>
@@ -4592,8 +4592,8 @@
         </p:blipFill>
         <p:spPr>
           <a:xfrm>
-            <a:off x="-1" y="1090487"/>
-            <a:ext cx="9151715" cy="5146826"/>
+            <a:off x="0" y="579273"/>
+            <a:ext cx="9144000" cy="5699454"/>
           </a:xfrm>
           <a:prstGeom prst="rect">
             <a:avLst/>
@@ -4826,11 +4826,7 @@
             <a:p>
               <a:r>
                 <a:rPr lang="pl-PL" sz="2000" dirty="0" smtClean="0"/>
-                <a:t>Stage</a:t>
-              </a:r>
-              <a:r>
-                <a:rPr lang="pl-PL" sz="2000" dirty="0" smtClean="0"/>
-                <a:t> 1</a:t>
+                <a:t>Stage 1</a:t>
               </a:r>
               <a:endParaRPr lang="pl-PL" sz="2000" dirty="0"/>
             </a:p>
@@ -4913,11 +4909,7 @@
             <a:p>
               <a:r>
                 <a:rPr lang="pl-PL" sz="2000" dirty="0" smtClean="0"/>
-                <a:t>Stage</a:t>
-              </a:r>
-              <a:r>
-                <a:rPr lang="pl-PL" sz="2000" dirty="0" smtClean="0"/>
-                <a:t> 2</a:t>
+                <a:t>Stage 2</a:t>
               </a:r>
               <a:endParaRPr lang="pl-PL" sz="2000" dirty="0"/>
             </a:p>
@@ -5397,11 +5389,7 @@
             </a:r>
             <a:r>
               <a:rPr lang="pl-PL" dirty="0" smtClean="0"/>
-              <a:t>lub </a:t>
-            </a:r>
-            <a:r>
-              <a:rPr lang="pl-PL" dirty="0" smtClean="0"/>
-              <a:t>BIMLScript</a:t>
+              <a:t>lub BIMLScript</a:t>
             </a:r>
             <a:endParaRPr lang="pl-PL" dirty="0"/>
           </a:p>
@@ -5517,11 +5505,7 @@
           <a:p>
             <a:r>
               <a:rPr lang="pl-PL" dirty="0" smtClean="0"/>
-              <a:t>DEMO </a:t>
-            </a:r>
-            <a:r>
-              <a:rPr lang="pl-PL" dirty="0" smtClean="0"/>
-              <a:t>BIMLScript</a:t>
+              <a:t>DEMO BIMLScript</a:t>
             </a:r>
             <a:endParaRPr lang="pl-PL" dirty="0"/>
           </a:p>
@@ -5641,11 +5625,7 @@
             </a:r>
             <a:r>
               <a:rPr lang="pl-PL" sz="2400" dirty="0"/>
-              <a:t>BIMLScript</a:t>
-            </a:r>
-            <a:r>
-              <a:rPr lang="pl-PL" sz="2400" dirty="0"/>
-              <a:t> stały się nieczytelne</a:t>
+              <a:t>BIMLScript stały się nieczytelne</a:t>
             </a:r>
           </a:p>
           <a:p>
@@ -5658,23 +5638,7 @@
             </a:pPr>
             <a:r>
               <a:rPr lang="pl-PL" sz="2400" dirty="0" smtClean="0"/>
-              <a:t>Kod C# wpleciony w </a:t>
-            </a:r>
-            <a:r>
-              <a:rPr lang="pl-PL" sz="2400" dirty="0" smtClean="0"/>
-              <a:t>XMLa</a:t>
-            </a:r>
-            <a:r>
-              <a:rPr lang="pl-PL" sz="2400" dirty="0" smtClean="0"/>
-              <a:t> z </a:t>
-            </a:r>
-            <a:r>
-              <a:rPr lang="pl-PL" sz="2400" dirty="0" smtClean="0"/>
-              <a:t>BIMLem</a:t>
-            </a:r>
-            <a:r>
-              <a:rPr lang="pl-PL" sz="2400" dirty="0" smtClean="0"/>
-              <a:t> był bardzo ciężki w utrzymaniu</a:t>
+              <a:t>Kod C# wpleciony w XMLa z BIMLem był bardzo ciężki w utrzymaniu</a:t>
             </a:r>
             <a:endParaRPr lang="pl-PL" sz="2400" dirty="0"/>
           </a:p>
@@ -5850,13 +5814,8 @@
             </a:pPr>
             <a:r>
               <a:rPr lang="pl-PL" sz="2400" dirty="0" smtClean="0"/>
-              <a:t>Pełne wsparcie dla </a:t>
-            </a:r>
-            <a:r>
-              <a:rPr lang="pl-PL" sz="2400" dirty="0" smtClean="0"/>
-              <a:t>Intellisense</a:t>
-            </a:r>
-            <a:endParaRPr lang="pl-PL" sz="2400" dirty="0" smtClean="0"/>
+              <a:t>Pełne wsparcie dla Intellisense</a:t>
+            </a:r>
           </a:p>
           <a:p>
             <a:pPr>
@@ -5947,11 +5906,7 @@
           <a:p>
             <a:r>
               <a:rPr lang="pl-PL" dirty="0" smtClean="0"/>
-              <a:t>DEMO </a:t>
-            </a:r>
-            <a:r>
-              <a:rPr lang="pl-PL" dirty="0" smtClean="0"/>
-              <a:t>framework</a:t>
+              <a:t>DEMO framework</a:t>
             </a:r>
             <a:endParaRPr lang="pl-PL" dirty="0"/>
           </a:p>
@@ -6701,11 +6656,7 @@
           <a:p>
             <a:r>
               <a:rPr lang="pl-PL" dirty="0" smtClean="0"/>
-              <a:t>BIDS </a:t>
-            </a:r>
-            <a:r>
-              <a:rPr lang="pl-PL" dirty="0" smtClean="0"/>
-              <a:t>Helper</a:t>
+              <a:t>BIDS Helper</a:t>
             </a:r>
             <a:r>
               <a:rPr lang="pl-PL" dirty="0"/>
@@ -6816,7 +6767,7 @@
       </p:grpSpPr>
       <p:pic>
         <p:nvPicPr>
-          <p:cNvPr id="7" name="Obraz 6"/>
+          <p:cNvPr id="3" name="Obraz 2"/>
           <p:cNvPicPr>
             <a:picLocks noChangeAspect="1"/>
           </p:cNvPicPr>
@@ -6836,8 +6787,8 @@
         </p:blipFill>
         <p:spPr>
           <a:xfrm>
-            <a:off x="23343" y="1052736"/>
-            <a:ext cx="9120657" cy="5129358"/>
+            <a:off x="0" y="579273"/>
+            <a:ext cx="9144000" cy="5699454"/>
           </a:xfrm>
           <a:prstGeom prst="rect">
             <a:avLst/>
@@ -7038,27 +6989,7 @@
             </a:pPr>
             <a:r>
               <a:rPr lang="pl-PL" sz="2400" dirty="0" smtClean="0"/>
-              <a:t>Zawodowo od dwóch lat zajmuje się utrzymaniem i rozwojem hurtowni danych opartej o technologie Microsoft (</a:t>
-            </a:r>
-            <a:r>
-              <a:rPr lang="pl-PL" sz="2400" dirty="0" smtClean="0"/>
-              <a:t>SqlServer</a:t>
-            </a:r>
-            <a:r>
-              <a:rPr lang="pl-PL" sz="2400" dirty="0" smtClean="0"/>
-              <a:t>, SSAS, SSIS, SSRS, </a:t>
-            </a:r>
-            <a:r>
-              <a:rPr lang="pl-PL" sz="2400" dirty="0" smtClean="0"/>
-              <a:t>Azure</a:t>
-            </a:r>
-            <a:r>
-              <a:rPr lang="pl-PL" sz="2400" dirty="0" smtClean="0"/>
-              <a:t>, .Net</a:t>
-            </a:r>
-            <a:r>
-              <a:rPr lang="pl-PL" sz="2400" dirty="0" smtClean="0"/>
-              <a:t>)</a:t>
+              <a:t>Zawodowo od dwóch lat zajmuje się utrzymaniem i rozwojem hurtowni danych opartej o technologie Microsoft (SqlServer, SSAS, SSIS, SSRS, Azure, .Net)</a:t>
             </a:r>
           </a:p>
           <a:p>
@@ -7071,31 +7002,7 @@
             </a:pPr>
             <a:r>
               <a:rPr lang="pl-PL" sz="2400" dirty="0" smtClean="0"/>
-              <a:t>Fan programowania wszelkiej maści. Począwszy od Javy, C# czy PowerShell przez </a:t>
-            </a:r>
-            <a:r>
-              <a:rPr lang="pl-PL" sz="2400" dirty="0" smtClean="0"/>
-              <a:t>tSQL</a:t>
-            </a:r>
-            <a:r>
-              <a:rPr lang="pl-PL" sz="2400" dirty="0" smtClean="0"/>
-              <a:t> i DAX na tworzeniu gier w Unity oraz modeli w </a:t>
-            </a:r>
-            <a:r>
-              <a:rPr lang="pl-PL" sz="2400" dirty="0" smtClean="0"/>
-              <a:t>Matlabie</a:t>
-            </a:r>
-            <a:r>
-              <a:rPr lang="pl-PL" sz="2400" dirty="0" smtClean="0"/>
-              <a:t> (</a:t>
-            </a:r>
-            <a:r>
-              <a:rPr lang="pl-PL" sz="2400" dirty="0" smtClean="0"/>
-              <a:t>Simulink</a:t>
-            </a:r>
-            <a:r>
-              <a:rPr lang="pl-PL" sz="2400" dirty="0" smtClean="0"/>
-              <a:t>) kończąc.</a:t>
+              <a:t>Fan programowania wszelkiej maści. Począwszy od Javy, C# czy PowerShell przez tSQL i DAX na tworzeniu gier w Unity oraz modeli w Matlabie (Simulink) kończąc.</a:t>
             </a:r>
           </a:p>
           <a:p>
@@ -7108,19 +7015,7 @@
             </a:pPr>
             <a:r>
               <a:rPr lang="pl-PL" sz="2400" dirty="0" smtClean="0"/>
-              <a:t>W wolnym czasie tańczy Salsę, </a:t>
-            </a:r>
-            <a:r>
-              <a:rPr lang="pl-PL" sz="2400" dirty="0" smtClean="0"/>
-              <a:t>Bachatę</a:t>
-            </a:r>
-            <a:r>
-              <a:rPr lang="pl-PL" sz="2400" dirty="0" smtClean="0"/>
-              <a:t>, </a:t>
-            </a:r>
-            <a:r>
-              <a:rPr lang="pl-PL" sz="2400" dirty="0" smtClean="0"/>
-              <a:t>Zouka</a:t>
+              <a:t>W wolnym czasie tańczy Salsę, Bachatę, Zouka</a:t>
             </a:r>
             <a:r>
               <a:rPr lang="pl-PL" sz="2400" dirty="0"/>
@@ -7128,15 +7023,7 @@
             </a:r>
             <a:r>
               <a:rPr lang="pl-PL" sz="2400" dirty="0" smtClean="0"/>
-              <a:t>i</a:t>
-            </a:r>
-            <a:r>
-              <a:rPr lang="pl-PL" sz="2400" dirty="0" smtClean="0"/>
-              <a:t> </a:t>
-            </a:r>
-            <a:r>
-              <a:rPr lang="pl-PL" sz="2400" dirty="0" smtClean="0"/>
-              <a:t>Reggaeton</a:t>
+              <a:t>i Reggaeton</a:t>
             </a:r>
             <a:endParaRPr lang="pl-PL" sz="2400" dirty="0"/>
           </a:p>
@@ -7225,15 +7112,7 @@
                   <a:schemeClr val="tx2"/>
                 </a:solidFill>
               </a:rPr>
-              <a:t>Roman Czarko-</a:t>
-            </a:r>
-            <a:r>
-              <a:rPr lang="pl-PL" dirty="0" smtClean="0">
-                <a:solidFill>
-                  <a:schemeClr val="tx2"/>
-                </a:solidFill>
-              </a:rPr>
-              <a:t>Wasiutycz</a:t>
+              <a:t>Roman Czarko-Wasiutycz</a:t>
             </a:r>
             <a:endParaRPr lang="pl-PL" dirty="0"/>
           </a:p>
@@ -7366,11 +7245,7 @@
             </a:r>
             <a:r>
               <a:rPr lang="pl-PL" sz="2250" dirty="0" smtClean="0"/>
-              <a:t>Business </a:t>
-            </a:r>
-            <a:r>
-              <a:rPr lang="pl-PL" sz="2250" dirty="0" smtClean="0"/>
-              <a:t>Intelligence</a:t>
+              <a:t>Business Intelligence</a:t>
             </a:r>
             <a:r>
               <a:rPr lang="pl-PL" sz="2250" dirty="0"/>
@@ -7391,15 +7266,7 @@
             </a:r>
             <a:r>
               <a:rPr lang="pl-PL" sz="2400" dirty="0"/>
-              <a:t>oraz współorganizator konferencji </a:t>
-            </a:r>
-            <a:r>
-              <a:rPr lang="pl-PL" sz="2400" dirty="0"/>
-              <a:t>SQLDay</a:t>
-            </a:r>
-            <a:r>
-              <a:rPr lang="pl-PL" sz="2400" dirty="0"/>
-              <a:t>. </a:t>
+              <a:t>oraz współorganizator konferencji SQLDay. </a:t>
             </a:r>
             <a:endParaRPr lang="pl-PL" sz="2400" dirty="0" smtClean="0"/>
           </a:p>
@@ -7553,15 +7420,7 @@
             </a:pPr>
             <a:r>
               <a:rPr lang="pl-PL" sz="2400" dirty="0"/>
-              <a:t>Co to jest BIML i </a:t>
-            </a:r>
-            <a:r>
-              <a:rPr lang="pl-PL" sz="2400" dirty="0"/>
-              <a:t>BIMLScript</a:t>
-            </a:r>
-            <a:r>
-              <a:rPr lang="pl-PL" sz="2400" dirty="0"/>
-              <a:t> </a:t>
+              <a:t>Co to jest BIML i BIMLScript </a:t>
             </a:r>
             <a:r>
               <a:rPr lang="pl-PL" sz="2400" dirty="0" smtClean="0"/>
@@ -7596,13 +7455,8 @@
             </a:pPr>
             <a:r>
               <a:rPr lang="pl-PL" sz="2400" dirty="0"/>
-              <a:t>Trochę marudzenia na </a:t>
-            </a:r>
-            <a:r>
-              <a:rPr lang="pl-PL" sz="2400" dirty="0"/>
-              <a:t>BIMLScript</a:t>
-            </a:r>
-            <a:endParaRPr lang="pl-PL" sz="2400" dirty="0"/>
+              <a:t>Trochę marudzenia na BIMLScript</a:t>
+            </a:r>
           </a:p>
           <a:p>
             <a:pPr>
@@ -7871,31 +7725,7 @@
               <a:rPr lang="pl-PL" dirty="0">
                 <a:hlinkClick r:id="rId3"/>
               </a:rPr>
-              <a:t>“</a:t>
-            </a:r>
-            <a:r>
-              <a:rPr lang="pl-PL" dirty="0">
-                <a:hlinkClick r:id="rId3"/>
-              </a:rPr>
-              <a:t>Easy</a:t>
-            </a:r>
-            <a:r>
-              <a:rPr lang="pl-PL" dirty="0">
-                <a:hlinkClick r:id="rId3"/>
-              </a:rPr>
-              <a:t> ETL with </a:t>
-            </a:r>
-            <a:r>
-              <a:rPr lang="pl-PL" dirty="0">
-                <a:hlinkClick r:id="rId3"/>
-              </a:rPr>
-              <a:t>Biml</a:t>
-            </a:r>
-            <a:r>
-              <a:rPr lang="pl-PL" dirty="0">
-                <a:hlinkClick r:id="rId3"/>
-              </a:rPr>
-              <a:t>”</a:t>
+              <a:t>“Easy ETL with Biml”</a:t>
             </a:r>
             <a:endParaRPr lang="pl-PL" dirty="0"/>
           </a:p>
@@ -8265,11 +8095,7 @@
             </a:r>
             <a:r>
               <a:rPr lang="pl-PL" sz="2400" dirty="0" smtClean="0"/>
-              <a:t>bugów</a:t>
-            </a:r>
-            <a:r>
-              <a:rPr lang="pl-PL" sz="2400" dirty="0" smtClean="0"/>
-              <a:t> </a:t>
+              <a:t>bugów </a:t>
             </a:r>
             <a:r>
               <a:rPr lang="pl-PL" sz="2400" dirty="0"/>

</xml_diff>